<commit_message>
Make into a coherent chapter
</commit_message>
<xml_diff>
--- a/inc-prev/contact_matrices.pptx
+++ b/inc-prev/contact_matrices.pptx
@@ -104,6 +104,11 @@
       </a:defRPr>
     </a:lvl9pPr>
   </p:defaultTextStyle>
+  <p:extLst>
+    <p:ext uri="{EFAFB233-063F-42B5-8137-9DF3F51BA10A}">
+      <p15:sldGuideLst xmlns:p15="http://schemas.microsoft.com/office/powerpoint/2012/main"/>
+    </p:ext>
+  </p:extLst>
 </p:presentation>
 </file>
 
@@ -256,7 +261,7 @@
           <a:p>
             <a:fld id="{9F4E9FB8-49F7-4015-9F0F-E2EF14CD4D3F}" type="datetimeFigureOut">
               <a:rPr lang="en-GB" smtClean="0"/>
-              <a:t>16/11/2023</a:t>
+              <a:t>21/12/2023</a:t>
             </a:fld>
             <a:endParaRPr lang="en-GB"/>
           </a:p>
@@ -456,7 +461,7 @@
           <a:p>
             <a:fld id="{9F4E9FB8-49F7-4015-9F0F-E2EF14CD4D3F}" type="datetimeFigureOut">
               <a:rPr lang="en-GB" smtClean="0"/>
-              <a:t>16/11/2023</a:t>
+              <a:t>21/12/2023</a:t>
             </a:fld>
             <a:endParaRPr lang="en-GB"/>
           </a:p>
@@ -666,7 +671,7 @@
           <a:p>
             <a:fld id="{9F4E9FB8-49F7-4015-9F0F-E2EF14CD4D3F}" type="datetimeFigureOut">
               <a:rPr lang="en-GB" smtClean="0"/>
-              <a:t>16/11/2023</a:t>
+              <a:t>21/12/2023</a:t>
             </a:fld>
             <a:endParaRPr lang="en-GB"/>
           </a:p>
@@ -866,7 +871,7 @@
           <a:p>
             <a:fld id="{9F4E9FB8-49F7-4015-9F0F-E2EF14CD4D3F}" type="datetimeFigureOut">
               <a:rPr lang="en-GB" smtClean="0"/>
-              <a:t>16/11/2023</a:t>
+              <a:t>21/12/2023</a:t>
             </a:fld>
             <a:endParaRPr lang="en-GB"/>
           </a:p>
@@ -1142,7 +1147,7 @@
           <a:p>
             <a:fld id="{9F4E9FB8-49F7-4015-9F0F-E2EF14CD4D3F}" type="datetimeFigureOut">
               <a:rPr lang="en-GB" smtClean="0"/>
-              <a:t>16/11/2023</a:t>
+              <a:t>21/12/2023</a:t>
             </a:fld>
             <a:endParaRPr lang="en-GB"/>
           </a:p>
@@ -1410,7 +1415,7 @@
           <a:p>
             <a:fld id="{9F4E9FB8-49F7-4015-9F0F-E2EF14CD4D3F}" type="datetimeFigureOut">
               <a:rPr lang="en-GB" smtClean="0"/>
-              <a:t>16/11/2023</a:t>
+              <a:t>21/12/2023</a:t>
             </a:fld>
             <a:endParaRPr lang="en-GB"/>
           </a:p>
@@ -1825,7 +1830,7 @@
           <a:p>
             <a:fld id="{9F4E9FB8-49F7-4015-9F0F-E2EF14CD4D3F}" type="datetimeFigureOut">
               <a:rPr lang="en-GB" smtClean="0"/>
-              <a:t>16/11/2023</a:t>
+              <a:t>21/12/2023</a:t>
             </a:fld>
             <a:endParaRPr lang="en-GB"/>
           </a:p>
@@ -1967,7 +1972,7 @@
           <a:p>
             <a:fld id="{9F4E9FB8-49F7-4015-9F0F-E2EF14CD4D3F}" type="datetimeFigureOut">
               <a:rPr lang="en-GB" smtClean="0"/>
-              <a:t>16/11/2023</a:t>
+              <a:t>21/12/2023</a:t>
             </a:fld>
             <a:endParaRPr lang="en-GB"/>
           </a:p>
@@ -2080,7 +2085,7 @@
           <a:p>
             <a:fld id="{9F4E9FB8-49F7-4015-9F0F-E2EF14CD4D3F}" type="datetimeFigureOut">
               <a:rPr lang="en-GB" smtClean="0"/>
-              <a:t>16/11/2023</a:t>
+              <a:t>21/12/2023</a:t>
             </a:fld>
             <a:endParaRPr lang="en-GB"/>
           </a:p>
@@ -2393,7 +2398,7 @@
           <a:p>
             <a:fld id="{9F4E9FB8-49F7-4015-9F0F-E2EF14CD4D3F}" type="datetimeFigureOut">
               <a:rPr lang="en-GB" smtClean="0"/>
-              <a:t>16/11/2023</a:t>
+              <a:t>21/12/2023</a:t>
             </a:fld>
             <a:endParaRPr lang="en-GB"/>
           </a:p>
@@ -2682,7 +2687,7 @@
           <a:p>
             <a:fld id="{9F4E9FB8-49F7-4015-9F0F-E2EF14CD4D3F}" type="datetimeFigureOut">
               <a:rPr lang="en-GB" smtClean="0"/>
-              <a:t>16/11/2023</a:t>
+              <a:t>21/12/2023</a:t>
             </a:fld>
             <a:endParaRPr lang="en-GB"/>
           </a:p>
@@ -2925,7 +2930,7 @@
           <a:p>
             <a:fld id="{9F4E9FB8-49F7-4015-9F0F-E2EF14CD4D3F}" type="datetimeFigureOut">
               <a:rPr lang="en-GB" smtClean="0"/>
-              <a:t>16/11/2023</a:t>
+              <a:t>21/12/2023</a:t>
             </a:fld>
             <a:endParaRPr lang="en-GB"/>
           </a:p>
@@ -3508,6 +3513,86 @@
           </a:p>
         </p:txBody>
       </p:sp>
+      <p:sp>
+        <p:nvSpPr>
+          <p:cNvPr id="2" name="TextBox 1">
+            <a:extLst>
+              <a:ext uri="{FF2B5EF4-FFF2-40B4-BE49-F238E27FC236}">
+                <a16:creationId xmlns:a16="http://schemas.microsoft.com/office/drawing/2014/main" id="{0759D049-B300-FCBB-1C22-A5100AA96DC8}"/>
+              </a:ext>
+            </a:extLst>
+          </p:cNvPr>
+          <p:cNvSpPr txBox="1"/>
+          <p:nvPr/>
+        </p:nvSpPr>
+        <p:spPr>
+          <a:xfrm>
+            <a:off x="993775" y="1054946"/>
+            <a:ext cx="993775" cy="230832"/>
+          </a:xfrm>
+          <a:prstGeom prst="rect">
+            <a:avLst/>
+          </a:prstGeom>
+          <a:solidFill>
+            <a:schemeClr val="bg1"/>
+          </a:solidFill>
+        </p:spPr>
+        <p:txBody>
+          <a:bodyPr wrap="square" rtlCol="0">
+            <a:spAutoFit/>
+          </a:bodyPr>
+          <a:lstStyle/>
+          <a:p>
+            <a:r>
+              <a:rPr lang="en-GB" sz="900" dirty="0">
+                <a:latin typeface="Arial" panose="020B0604020202020204" pitchFamily="34" charset="0"/>
+                <a:cs typeface="Arial" panose="020B0604020202020204" pitchFamily="34" charset="0"/>
+              </a:rPr>
+              <a:t>(A) BBC survey</a:t>
+            </a:r>
+          </a:p>
+        </p:txBody>
+      </p:sp>
+      <p:sp>
+        <p:nvSpPr>
+          <p:cNvPr id="3" name="TextBox 2">
+            <a:extLst>
+              <a:ext uri="{FF2B5EF4-FFF2-40B4-BE49-F238E27FC236}">
+                <a16:creationId xmlns:a16="http://schemas.microsoft.com/office/drawing/2014/main" id="{F4934517-1C33-6041-5BCF-C93E4EB69F99}"/>
+              </a:ext>
+            </a:extLst>
+          </p:cNvPr>
+          <p:cNvSpPr txBox="1"/>
+          <p:nvPr/>
+        </p:nvSpPr>
+        <p:spPr>
+          <a:xfrm>
+            <a:off x="3841482" y="1011583"/>
+            <a:ext cx="1521093" cy="230832"/>
+          </a:xfrm>
+          <a:prstGeom prst="rect">
+            <a:avLst/>
+          </a:prstGeom>
+          <a:solidFill>
+            <a:schemeClr val="bg1"/>
+          </a:solidFill>
+        </p:spPr>
+        <p:txBody>
+          <a:bodyPr wrap="square" rtlCol="0">
+            <a:spAutoFit/>
+          </a:bodyPr>
+          <a:lstStyle/>
+          <a:p>
+            <a:r>
+              <a:rPr lang="en-GB" sz="900" dirty="0">
+                <a:latin typeface="Arial" panose="020B0604020202020204" pitchFamily="34" charset="0"/>
+                <a:cs typeface="Arial" panose="020B0604020202020204" pitchFamily="34" charset="0"/>
+              </a:rPr>
+              <a:t>(B) POLYMOD survey</a:t>
+            </a:r>
+          </a:p>
+        </p:txBody>
+      </p:sp>
     </p:spTree>
     <p:extLst>
       <p:ext uri="{BB962C8B-B14F-4D97-AF65-F5344CB8AC3E}">

</xml_diff>